<commit_message>
Change font in trainer presentation.
</commit_message>
<xml_diff>
--- a/presentation/schonherz-2016-autumn-trainer-presentation.pptx
+++ b/presentation/schonherz-2016-autumn-trainer-presentation.pptx
@@ -216,7 +216,7 @@
           <a:p>
             <a:fld id="{E39E7885-5E45-4121-B447-F34D02245201}" type="datetimeFigureOut">
               <a:rPr lang="en-US" smtClean="0"/>
-              <a:t>3/7/2017</a:t>
+              <a:t>3/8/2017</a:t>
             </a:fld>
             <a:endParaRPr lang="en-US"/>
           </a:p>
@@ -1396,7 +1396,7 @@
           <a:p>
             <a:fld id="{C6E8B002-83F0-41C5-A7B7-2819A96BD9B2}" type="datetimeFigureOut">
               <a:rPr lang="hu-HU" smtClean="0"/>
-              <a:t>2017. 03. 07.</a:t>
+              <a:t>2017.03.08.</a:t>
             </a:fld>
             <a:endParaRPr lang="hu-HU"/>
           </a:p>
@@ -1566,7 +1566,7 @@
           <a:p>
             <a:fld id="{C6E8B002-83F0-41C5-A7B7-2819A96BD9B2}" type="datetimeFigureOut">
               <a:rPr lang="hu-HU" smtClean="0"/>
-              <a:t>2017. 03. 07.</a:t>
+              <a:t>2017.03.08.</a:t>
             </a:fld>
             <a:endParaRPr lang="hu-HU"/>
           </a:p>
@@ -1746,7 +1746,7 @@
           <a:p>
             <a:fld id="{C6E8B002-83F0-41C5-A7B7-2819A96BD9B2}" type="datetimeFigureOut">
               <a:rPr lang="hu-HU" smtClean="0"/>
-              <a:t>2017. 03. 07.</a:t>
+              <a:t>2017.03.08.</a:t>
             </a:fld>
             <a:endParaRPr lang="hu-HU"/>
           </a:p>
@@ -1916,7 +1916,7 @@
           <a:p>
             <a:fld id="{C6E8B002-83F0-41C5-A7B7-2819A96BD9B2}" type="datetimeFigureOut">
               <a:rPr lang="hu-HU" smtClean="0"/>
-              <a:t>2017. 03. 07.</a:t>
+              <a:t>2017.03.08.</a:t>
             </a:fld>
             <a:endParaRPr lang="hu-HU"/>
           </a:p>
@@ -2160,7 +2160,7 @@
           <a:p>
             <a:fld id="{C6E8B002-83F0-41C5-A7B7-2819A96BD9B2}" type="datetimeFigureOut">
               <a:rPr lang="hu-HU" smtClean="0"/>
-              <a:t>2017. 03. 07.</a:t>
+              <a:t>2017.03.08.</a:t>
             </a:fld>
             <a:endParaRPr lang="hu-HU"/>
           </a:p>
@@ -2392,7 +2392,7 @@
           <a:p>
             <a:fld id="{C6E8B002-83F0-41C5-A7B7-2819A96BD9B2}" type="datetimeFigureOut">
               <a:rPr lang="hu-HU" smtClean="0"/>
-              <a:t>2017. 03. 07.</a:t>
+              <a:t>2017.03.08.</a:t>
             </a:fld>
             <a:endParaRPr lang="hu-HU"/>
           </a:p>
@@ -2759,7 +2759,7 @@
           <a:p>
             <a:fld id="{C6E8B002-83F0-41C5-A7B7-2819A96BD9B2}" type="datetimeFigureOut">
               <a:rPr lang="hu-HU" smtClean="0"/>
-              <a:t>2017. 03. 07.</a:t>
+              <a:t>2017.03.08.</a:t>
             </a:fld>
             <a:endParaRPr lang="hu-HU"/>
           </a:p>
@@ -2877,7 +2877,7 @@
           <a:p>
             <a:fld id="{C6E8B002-83F0-41C5-A7B7-2819A96BD9B2}" type="datetimeFigureOut">
               <a:rPr lang="hu-HU" smtClean="0"/>
-              <a:t>2017. 03. 07.</a:t>
+              <a:t>2017.03.08.</a:t>
             </a:fld>
             <a:endParaRPr lang="hu-HU"/>
           </a:p>
@@ -2972,7 +2972,7 @@
           <a:p>
             <a:fld id="{C6E8B002-83F0-41C5-A7B7-2819A96BD9B2}" type="datetimeFigureOut">
               <a:rPr lang="hu-HU" smtClean="0"/>
-              <a:t>2017. 03. 07.</a:t>
+              <a:t>2017.03.08.</a:t>
             </a:fld>
             <a:endParaRPr lang="hu-HU"/>
           </a:p>
@@ -3249,7 +3249,7 @@
           <a:p>
             <a:fld id="{C6E8B002-83F0-41C5-A7B7-2819A96BD9B2}" type="datetimeFigureOut">
               <a:rPr lang="hu-HU" smtClean="0"/>
-              <a:t>2017. 03. 07.</a:t>
+              <a:t>2017.03.08.</a:t>
             </a:fld>
             <a:endParaRPr lang="hu-HU"/>
           </a:p>
@@ -3506,7 +3506,7 @@
           <a:p>
             <a:fld id="{C6E8B002-83F0-41C5-A7B7-2819A96BD9B2}" type="datetimeFigureOut">
               <a:rPr lang="hu-HU" smtClean="0"/>
-              <a:t>2017. 03. 07.</a:t>
+              <a:t>2017.03.08.</a:t>
             </a:fld>
             <a:endParaRPr lang="hu-HU"/>
           </a:p>
@@ -3726,7 +3726,7 @@
           <a:p>
             <a:fld id="{C6E8B002-83F0-41C5-A7B7-2819A96BD9B2}" type="datetimeFigureOut">
               <a:rPr lang="hu-HU" smtClean="0"/>
-              <a:t>2017. 03. 07.</a:t>
+              <a:t>2017.03.08.</a:t>
             </a:fld>
             <a:endParaRPr lang="hu-HU"/>
           </a:p>
@@ -4243,12 +4243,12 @@
             <a:pPr algn="l"/>
             <a:r>
               <a:rPr lang="hu-HU" sz="2800" b="1" cap="all" dirty="0">
-                <a:latin typeface="Oswald" panose="02000503000000000000" pitchFamily="2" charset="0"/>
+                <a:latin typeface="Calibri" panose="020F0502020204030204" pitchFamily="34" charset="0"/>
               </a:rPr>
               <a:t>Bemutatkozás</a:t>
             </a:r>
             <a:endParaRPr lang="hu-HU" sz="3600" b="1" cap="all" dirty="0">
-              <a:latin typeface="Oswald" panose="02000503000000000000" pitchFamily="2" charset="0"/>
+              <a:latin typeface="Calibri" panose="020F0502020204030204" pitchFamily="34" charset="0"/>
             </a:endParaRPr>
           </a:p>
         </p:txBody>
@@ -4711,14 +4711,10 @@
           <a:p>
             <a:pPr algn="l"/>
             <a:r>
-              <a:rPr lang="hu-HU" sz="2800" b="1" cap="all" dirty="0">
-                <a:latin typeface="Oswald" panose="02000503000000000000" pitchFamily="2" charset="0"/>
-              </a:rPr>
+              <a:rPr lang="hu-HU" sz="2800" b="1" cap="all" smtClean="0"/>
               <a:t>oktatótársak</a:t>
             </a:r>
-            <a:endParaRPr lang="hu-HU" sz="3600" b="1" cap="all" dirty="0">
-              <a:latin typeface="Oswald" panose="02000503000000000000" pitchFamily="2" charset="0"/>
-            </a:endParaRPr>
+            <a:endParaRPr lang="hu-HU" sz="3600" b="1" cap="all" dirty="0"/>
           </a:p>
         </p:txBody>
       </p:sp>
@@ -5289,14 +5285,10 @@
           <a:p>
             <a:pPr algn="l"/>
             <a:r>
-              <a:rPr lang="hu-HU" sz="2800" b="1" cap="all" dirty="0">
-                <a:latin typeface="Oswald" panose="02000503000000000000" pitchFamily="2" charset="0"/>
-              </a:rPr>
+              <a:rPr lang="hu-HU" sz="2800" b="1" cap="all" dirty="0"/>
               <a:t>Az oktatás</a:t>
             </a:r>
-            <a:endParaRPr lang="hu-HU" sz="3600" b="1" cap="all" dirty="0">
-              <a:latin typeface="Oswald" panose="02000503000000000000" pitchFamily="2" charset="0"/>
-            </a:endParaRPr>
+            <a:endParaRPr lang="hu-HU" sz="3600" b="1" cap="all" dirty="0"/>
           </a:p>
         </p:txBody>
       </p:sp>
@@ -5788,14 +5780,10 @@
           <a:p>
             <a:pPr algn="l"/>
             <a:r>
-              <a:rPr lang="hu-HU" sz="2800" b="1" cap="all" dirty="0">
-                <a:latin typeface="Oswald" panose="02000503000000000000" pitchFamily="2" charset="0"/>
-              </a:rPr>
+              <a:rPr lang="hu-HU" sz="2800" b="1" cap="all" dirty="0"/>
               <a:t>Az oktatás</a:t>
             </a:r>
-            <a:endParaRPr lang="hu-HU" sz="3600" b="1" cap="all" dirty="0">
-              <a:latin typeface="Oswald" panose="02000503000000000000" pitchFamily="2" charset="0"/>
-            </a:endParaRPr>
+            <a:endParaRPr lang="hu-HU" sz="3600" b="1" cap="all" dirty="0"/>
           </a:p>
         </p:txBody>
       </p:sp>
@@ -6377,14 +6365,10 @@
           <a:p>
             <a:pPr algn="l"/>
             <a:r>
-              <a:rPr lang="hu-HU" sz="2800" b="1" cap="all" dirty="0">
-                <a:latin typeface="Oswald" panose="02000503000000000000" pitchFamily="2" charset="0"/>
-              </a:rPr>
+              <a:rPr lang="hu-HU" sz="2800" b="1" cap="all" dirty="0"/>
               <a:t>Az oktatás</a:t>
             </a:r>
-            <a:endParaRPr lang="hu-HU" sz="3600" b="1" cap="all" dirty="0">
-              <a:latin typeface="Oswald" panose="02000503000000000000" pitchFamily="2" charset="0"/>
-            </a:endParaRPr>
+            <a:endParaRPr lang="hu-HU" sz="3600" b="1" cap="all" dirty="0"/>
           </a:p>
         </p:txBody>
       </p:sp>
@@ -6985,14 +6969,10 @@
           <a:p>
             <a:pPr algn="l"/>
             <a:r>
-              <a:rPr lang="hu-HU" sz="2800" b="1" cap="all" dirty="0">
-                <a:latin typeface="Oswald" panose="02000503000000000000" pitchFamily="2" charset="0"/>
-              </a:rPr>
+              <a:rPr lang="hu-HU" sz="2800" b="1" cap="all" dirty="0"/>
               <a:t>Az oktatás</a:t>
             </a:r>
-            <a:endParaRPr lang="hu-HU" sz="3600" b="1" cap="all" dirty="0">
-              <a:latin typeface="Oswald" panose="02000503000000000000" pitchFamily="2" charset="0"/>
-            </a:endParaRPr>
+            <a:endParaRPr lang="hu-HU" sz="3600" b="1" cap="all" dirty="0"/>
           </a:p>
         </p:txBody>
       </p:sp>
@@ -7293,14 +7273,10 @@
           <a:p>
             <a:pPr algn="l"/>
             <a:r>
-              <a:rPr lang="hu-HU" sz="2800" b="1" cap="all" dirty="0">
-                <a:latin typeface="Oswald" panose="02000503000000000000" pitchFamily="2" charset="0"/>
-              </a:rPr>
-              <a:t>Az oktatás</a:t>
-            </a:r>
-            <a:endParaRPr lang="hu-HU" sz="3600" b="1" cap="all" dirty="0">
-              <a:latin typeface="Oswald" panose="02000503000000000000" pitchFamily="2" charset="0"/>
-            </a:endParaRPr>
+              <a:rPr lang="hu-HU" sz="2800" b="1" cap="all" smtClean="0"/>
+              <a:t>A projekt</a:t>
+            </a:r>
+            <a:endParaRPr lang="hu-HU" sz="3600" b="1" cap="all" dirty="0"/>
           </a:p>
         </p:txBody>
       </p:sp>
@@ -7481,10 +7457,18 @@
                   <a:srgbClr val="0070C0"/>
                 </a:solidFill>
               </a:rPr>
-              <a:t>~12.000</a:t>
-            </a:r>
-            <a:r>
-              <a:rPr lang="hu-HU" sz="3200" dirty="0">
+              <a:t>~</a:t>
+            </a:r>
+            <a:r>
+              <a:rPr lang="hu-HU" sz="4000" b="1">
+                <a:solidFill>
+                  <a:srgbClr val="0070C0"/>
+                </a:solidFill>
+              </a:rPr>
+              <a:t>12.000</a:t>
+            </a:r>
+            <a:r>
+              <a:rPr lang="hu-HU" sz="3200">
                 <a:solidFill>
                   <a:srgbClr val="0070C0"/>
                 </a:solidFill>
@@ -7492,8 +7476,12 @@
               <a:t> </a:t>
             </a:r>
             <a:r>
+              <a:rPr lang="hu-HU" sz="3200" smtClean="0"/>
+              <a:t>sor </a:t>
+            </a:r>
+            <a:r>
               <a:rPr lang="hu-HU" sz="3200" dirty="0"/>
-              <a:t>sornyi Java kód</a:t>
+              <a:t>Java kód</a:t>
             </a:r>
           </a:p>
           <a:p>
@@ -8329,6 +8317,12 @@
 </file>
 
 <file path=customXml/item2.xml><?xml version="1.0" encoding="utf-8"?>
+<p:properties xmlns:p="http://schemas.microsoft.com/office/2006/metadata/properties" xmlns:xsi="http://www.w3.org/2001/XMLSchema-instance" xmlns:pc="http://schemas.microsoft.com/office/infopath/2007/PartnerControls">
+  <documentManagement/>
+</p:properties>
+</file>
+
+<file path=customXml/item3.xml><?xml version="1.0" encoding="utf-8"?>
 <ct:contentTypeSchema xmlns:ct="http://schemas.microsoft.com/office/2006/metadata/contentType" xmlns:ma="http://schemas.microsoft.com/office/2006/metadata/properties/metaAttributes" ct:_="" ma:_="" ma:contentTypeName="Dokumentum" ma:contentTypeID="0x010100AC862C676857C24E8FC2D32B30708833" ma:contentTypeVersion="2" ma:contentTypeDescription="Új dokumentum létrehozása." ma:contentTypeScope="" ma:versionID="0d2981163f66270cf1daba8c3c407cc5">
   <xsd:schema xmlns:xsd="http://www.w3.org/2001/XMLSchema" xmlns:xs="http://www.w3.org/2001/XMLSchema" xmlns:p="http://schemas.microsoft.com/office/2006/metadata/properties" xmlns:ns2="9a324a02-be43-499b-8089-7896e70993e7" targetNamespace="http://schemas.microsoft.com/office/2006/metadata/properties" ma:root="true" ma:fieldsID="4ce273e9ed9981a51826152e27a7d1ee" ns2:_="">
     <xsd:import namespace="9a324a02-be43-499b-8089-7896e70993e7"/>
@@ -8476,12 +8470,6 @@
 </ct:contentTypeSchema>
 </file>
 
-<file path=customXml/item3.xml><?xml version="1.0" encoding="utf-8"?>
-<p:properties xmlns:p="http://schemas.microsoft.com/office/2006/metadata/properties" xmlns:xsi="http://www.w3.org/2001/XMLSchema-instance" xmlns:pc="http://schemas.microsoft.com/office/infopath/2007/PartnerControls">
-  <documentManagement/>
-</p:properties>
-</file>
-
 <file path=customXml/itemProps1.xml><?xml version="1.0" encoding="utf-8"?>
 <ds:datastoreItem xmlns:ds="http://schemas.openxmlformats.org/officeDocument/2006/customXml" ds:itemID="{D0D6E160-F9CB-4F5A-A037-52FEB0EEC292}">
   <ds:schemaRefs>
@@ -8491,6 +8479,22 @@
 </file>
 
 <file path=customXml/itemProps2.xml><?xml version="1.0" encoding="utf-8"?>
+<ds:datastoreItem xmlns:ds="http://schemas.openxmlformats.org/officeDocument/2006/customXml" ds:itemID="{10F2D43D-C93E-48A8-B106-121BCA581E3A}">
+  <ds:schemaRefs>
+    <ds:schemaRef ds:uri="9a324a02-be43-499b-8089-7896e70993e7"/>
+    <ds:schemaRef ds:uri="http://purl.org/dc/elements/1.1/"/>
+    <ds:schemaRef ds:uri="http://schemas.microsoft.com/office/2006/metadata/properties"/>
+    <ds:schemaRef ds:uri="http://schemas.microsoft.com/office/2006/documentManagement/types"/>
+    <ds:schemaRef ds:uri="http://purl.org/dc/terms/"/>
+    <ds:schemaRef ds:uri="http://schemas.openxmlformats.org/package/2006/metadata/core-properties"/>
+    <ds:schemaRef ds:uri="http://purl.org/dc/dcmitype/"/>
+    <ds:schemaRef ds:uri="http://schemas.microsoft.com/office/infopath/2007/PartnerControls"/>
+    <ds:schemaRef ds:uri="http://www.w3.org/XML/1998/namespace"/>
+  </ds:schemaRefs>
+</ds:datastoreItem>
+</file>
+
+<file path=customXml/itemProps3.xml><?xml version="1.0" encoding="utf-8"?>
 <ds:datastoreItem xmlns:ds="http://schemas.openxmlformats.org/officeDocument/2006/customXml" ds:itemID="{25AD155C-7032-4B6F-A2DE-ADEB0186CA3C}">
   <ds:schemaRefs>
     <ds:schemaRef ds:uri="http://schemas.microsoft.com/office/2006/metadata/contentType"/>
@@ -8506,20 +8510,4 @@
     <ds:schemaRef ds:uri="http://schemas.microsoft.com/internal/obd"/>
   </ds:schemaRefs>
 </ds:datastoreItem>
-</file>
-
-<file path=customXml/itemProps3.xml><?xml version="1.0" encoding="utf-8"?>
-<ds:datastoreItem xmlns:ds="http://schemas.openxmlformats.org/officeDocument/2006/customXml" ds:itemID="{10F2D43D-C93E-48A8-B106-121BCA581E3A}">
-  <ds:schemaRefs>
-    <ds:schemaRef ds:uri="9a324a02-be43-499b-8089-7896e70993e7"/>
-    <ds:schemaRef ds:uri="http://purl.org/dc/elements/1.1/"/>
-    <ds:schemaRef ds:uri="http://schemas.microsoft.com/office/2006/metadata/properties"/>
-    <ds:schemaRef ds:uri="http://schemas.microsoft.com/office/2006/documentManagement/types"/>
-    <ds:schemaRef ds:uri="http://purl.org/dc/terms/"/>
-    <ds:schemaRef ds:uri="http://schemas.openxmlformats.org/package/2006/metadata/core-properties"/>
-    <ds:schemaRef ds:uri="http://purl.org/dc/dcmitype/"/>
-    <ds:schemaRef ds:uri="http://schemas.microsoft.com/office/infopath/2007/PartnerControls"/>
-    <ds:schemaRef ds:uri="http://www.w3.org/XML/1998/namespace"/>
-  </ds:schemaRefs>
-</ds:datastoreItem>
 </file>
</xml_diff>